<commit_message>
9:40 day before final
</commit_message>
<xml_diff>
--- a/MY CAPSTONE PROJECT-.pptx
+++ b/MY CAPSTONE PROJECT-.pptx
@@ -7,8 +7,8 @@
   <p:sldIdLst>
     <p:sldId id="256" r:id="rId2"/>
     <p:sldId id="257" r:id="rId3"/>
-    <p:sldId id="258" r:id="rId4"/>
-    <p:sldId id="259" r:id="rId5"/>
+    <p:sldId id="259" r:id="rId4"/>
+    <p:sldId id="258" r:id="rId5"/>
     <p:sldId id="260" r:id="rId6"/>
   </p:sldIdLst>
   <p:sldSz cx="9144000" cy="6858000" type="screen4x3"/>
@@ -7996,7 +7996,7 @@
           <p:cNvPr id="7" name="Title 6">
             <a:extLst>
               <a:ext uri="{FF2B5EF4-FFF2-40B4-BE49-F238E27FC236}">
-                <a16:creationId xmlns="" xmlns:a16="http://schemas.microsoft.com/office/drawing/2014/main" id="{6AFCD08B-A734-4E8B-96BC-383BBB8FF399}"/>
+                <a16:creationId xmlns:a16="http://schemas.microsoft.com/office/drawing/2014/main" id="{6AFCD08B-A734-4E8B-96BC-383BBB8FF399}"/>
               </a:ext>
             </a:extLst>
           </p:cNvPr>
@@ -8053,10 +8053,6 @@
               <a:rPr lang="en-GB" sz="3600" dirty="0"/>
               <a:t>-Integrated Electrical Maintenance Equipment Analysis (2018-2021)</a:t>
             </a:r>
-            <a:r>
-              <a:rPr lang="en-IN" sz="3600" dirty="0"/>
-              <a:t/>
-            </a:r>
             <a:br>
               <a:rPr lang="en-IN" sz="3600" dirty="0"/>
             </a:br>
@@ -8069,7 +8065,7 @@
           <p:cNvPr id="4" name="Subtitle 2">
             <a:extLst>
               <a:ext uri="{FF2B5EF4-FFF2-40B4-BE49-F238E27FC236}">
-                <a16:creationId xmlns="" xmlns:a16="http://schemas.microsoft.com/office/drawing/2014/main" id="{FEDEE3CB-1D98-433C-ABCB-B87DA4F9D00F}"/>
+                <a16:creationId xmlns:a16="http://schemas.microsoft.com/office/drawing/2014/main" id="{FEDEE3CB-1D98-433C-ABCB-B87DA4F9D00F}"/>
               </a:ext>
             </a:extLst>
           </p:cNvPr>
@@ -8268,7 +8264,7 @@
           <p:cNvPr id="9" name="Content Placeholder 8">
             <a:extLst>
               <a:ext uri="{FF2B5EF4-FFF2-40B4-BE49-F238E27FC236}">
-                <a16:creationId xmlns="" xmlns:a16="http://schemas.microsoft.com/office/drawing/2014/main" id="{2083C8A6-51D0-41BC-B9C0-DACDE20AE6B4}"/>
+                <a16:creationId xmlns:a16="http://schemas.microsoft.com/office/drawing/2014/main" id="{2083C8A6-51D0-41BC-B9C0-DACDE20AE6B4}"/>
               </a:ext>
             </a:extLst>
           </p:cNvPr>
@@ -8279,7 +8275,12 @@
             <p:ph idx="1"/>
           </p:nvPr>
         </p:nvSpPr>
-        <p:spPr/>
+        <p:spPr>
+          <a:xfrm>
+            <a:off x="533400" y="2336873"/>
+            <a:ext cx="7998204" cy="3599316"/>
+          </a:xfrm>
+        </p:spPr>
         <p:txBody>
           <a:bodyPr/>
           <a:lstStyle/>
@@ -8288,10 +8289,36 @@
               <a:buNone/>
             </a:pPr>
             <a:r>
-              <a:rPr lang="en-GB" dirty="0" smtClean="0"/>
+              <a:rPr lang="en-GB" dirty="0"/>
               <a:t>Business in Brief:</a:t>
             </a:r>
-            <a:endParaRPr lang="en-IN" dirty="0"/>
+          </a:p>
+          <a:p>
+            <a:r>
+              <a:rPr lang="en-IN" sz="2000" dirty="0">
+                <a:latin typeface="Arial Rounded MT Bold" panose="020F0704030504030204" pitchFamily="34" charset="0"/>
+              </a:rPr>
+              <a:t>Data is collected for a Cold Roll Mill of TATA STEEL, CRM produces steel sheets for various applications like automobile skin panel, corrugated sheets ..etc .</a:t>
+            </a:r>
+          </a:p>
+          <a:p>
+            <a:r>
+              <a:rPr lang="en-IN" sz="2000" dirty="0">
+                <a:latin typeface="Arial Rounded MT Bold" panose="020F0704030504030204" pitchFamily="34" charset="0"/>
+              </a:rPr>
+              <a:t>An Electrical agency maintains and fix any abnormality of electrical equipment and automation systems. It is also responsible for upgrades and commissioning of new systems introduced for increasing efficiency of process.</a:t>
+            </a:r>
+          </a:p>
+          <a:p>
+            <a:endParaRPr lang="en-IN" sz="2000" dirty="0">
+              <a:latin typeface="Arial Rounded MT Bold" panose="020F0704030504030204" pitchFamily="34" charset="0"/>
+            </a:endParaRPr>
+          </a:p>
+          <a:p>
+            <a:pPr marL="0" indent="0">
+              <a:buNone/>
+            </a:pPr>
+            <a:endParaRPr lang="en-IN" sz="2000" dirty="0"/>
           </a:p>
         </p:txBody>
       </p:sp>
@@ -8305,13 +8332,6 @@
   <p:clrMapOvr>
     <a:masterClrMapping/>
   </p:clrMapOvr>
-  <p:timing>
-    <p:tnLst>
-      <p:par>
-        <p:cTn id="1" dur="indefinite" restart="never" nodeType="tmRoot"/>
-      </p:par>
-    </p:tnLst>
-  </p:timing>
 </p:sld>
 </file>
 
@@ -8594,7 +8614,7 @@
           <p:cNvPr id="17" name="Rectangle: Rounded Corners 16">
             <a:extLst>
               <a:ext uri="{FF2B5EF4-FFF2-40B4-BE49-F238E27FC236}">
-                <a16:creationId xmlns="" xmlns:a16="http://schemas.microsoft.com/office/drawing/2014/main" id="{32023443-AC5C-42D6-8863-7C367EC46D63}"/>
+                <a16:creationId xmlns:a16="http://schemas.microsoft.com/office/drawing/2014/main" id="{32023443-AC5C-42D6-8863-7C367EC46D63}"/>
               </a:ext>
             </a:extLst>
           </p:cNvPr>
@@ -8656,7 +8676,7 @@
           <p:cNvPr id="25" name="Rectangle: Rounded Corners 24">
             <a:extLst>
               <a:ext uri="{FF2B5EF4-FFF2-40B4-BE49-F238E27FC236}">
-                <a16:creationId xmlns="" xmlns:a16="http://schemas.microsoft.com/office/drawing/2014/main" id="{EDAADE7B-8A0C-4108-9E16-4BD5EB401E47}"/>
+                <a16:creationId xmlns:a16="http://schemas.microsoft.com/office/drawing/2014/main" id="{EDAADE7B-8A0C-4108-9E16-4BD5EB401E47}"/>
               </a:ext>
             </a:extLst>
           </p:cNvPr>
@@ -8718,7 +8738,7 @@
           <p:cNvPr id="27" name="Right Arrow 9">
             <a:extLst>
               <a:ext uri="{FF2B5EF4-FFF2-40B4-BE49-F238E27FC236}">
-                <a16:creationId xmlns="" xmlns:a16="http://schemas.microsoft.com/office/drawing/2014/main" id="{E3E6BC0F-C30F-456A-B4F6-2797F8309A50}"/>
+                <a16:creationId xmlns:a16="http://schemas.microsoft.com/office/drawing/2014/main" id="{E3E6BC0F-C30F-456A-B4F6-2797F8309A50}"/>
               </a:ext>
             </a:extLst>
           </p:cNvPr>
@@ -8764,7 +8784,7 @@
           <p:cNvPr id="28" name="Rectangle: Rounded Corners 27">
             <a:extLst>
               <a:ext uri="{FF2B5EF4-FFF2-40B4-BE49-F238E27FC236}">
-                <a16:creationId xmlns="" xmlns:a16="http://schemas.microsoft.com/office/drawing/2014/main" id="{7541310D-8746-42F5-92B1-28AA7F6857A2}"/>
+                <a16:creationId xmlns:a16="http://schemas.microsoft.com/office/drawing/2014/main" id="{7541310D-8746-42F5-92B1-28AA7F6857A2}"/>
               </a:ext>
             </a:extLst>
           </p:cNvPr>
@@ -8826,7 +8846,7 @@
           <p:cNvPr id="22" name="TextBox 21">
             <a:extLst>
               <a:ext uri="{FF2B5EF4-FFF2-40B4-BE49-F238E27FC236}">
-                <a16:creationId xmlns="" xmlns:a16="http://schemas.microsoft.com/office/drawing/2014/main" id="{EC3666FE-107A-430A-8610-8F2E5F7E8DDF}"/>
+                <a16:creationId xmlns:a16="http://schemas.microsoft.com/office/drawing/2014/main" id="{EC3666FE-107A-430A-8610-8F2E5F7E8DDF}"/>
               </a:ext>
             </a:extLst>
           </p:cNvPr>
@@ -8859,29 +8879,17 @@
             </a:r>
             <a:r>
               <a:rPr lang="en-IN" sz="1600" dirty="0"/>
-              <a:t> over past 3 years of my department was  exported in excel, pre-processing includes filtering </a:t>
-            </a:r>
-            <a:r>
-              <a:rPr lang="en-IN" sz="1600" dirty="0" smtClean="0"/>
-              <a:t>raw data </a:t>
-            </a:r>
-            <a:r>
-              <a:rPr lang="en-IN" sz="1600" dirty="0"/>
-              <a:t>for my section(F&amp;D</a:t>
-            </a:r>
-            <a:r>
-              <a:rPr lang="en-IN" sz="1600" dirty="0" smtClean="0"/>
-              <a:t>) and deleting non electrical items.</a:t>
-            </a:r>
-          </a:p>
-          <a:p>
-            <a:r>
-              <a:rPr lang="en-GB" sz="1600" dirty="0" smtClean="0"/>
+              <a:t> over past 3 years of my department was  exported in excel, pre-processing includes filtering raw data for my section(F&amp;D) and deleting non electrical items.</a:t>
+            </a:r>
+          </a:p>
+          <a:p>
+            <a:r>
+              <a:rPr lang="en-GB" sz="1600" dirty="0"/>
               <a:t>I learned and used GitHub for working on my project from both home and office.</a:t>
             </a:r>
           </a:p>
           <a:p>
-            <a:endParaRPr lang="en-GB" sz="1600" dirty="0" smtClean="0"/>
+            <a:endParaRPr lang="en-GB" sz="1600" dirty="0"/>
           </a:p>
           <a:p>
             <a:endParaRPr lang="en-IN" sz="1600" dirty="0"/>
@@ -8938,13 +8946,6 @@
   <p:clrMapOvr>
     <a:masterClrMapping/>
   </p:clrMapOvr>
-  <p:timing>
-    <p:tnLst>
-      <p:par>
-        <p:cTn id="1" dur="indefinite" restart="never" nodeType="tmRoot"/>
-      </p:par>
-    </p:tnLst>
-  </p:timing>
 </p:sld>
 </file>
 
@@ -9013,7 +9014,7 @@
         </p:nvSpPr>
         <p:spPr>
           <a:xfrm>
-            <a:off x="385332" y="420976"/>
+            <a:off x="360806" y="101317"/>
             <a:ext cx="6740917" cy="455986"/>
           </a:xfrm>
         </p:spPr>
@@ -9036,23 +9037,124 @@
           </a:p>
         </p:txBody>
       </p:sp>
+      <p:pic>
+        <p:nvPicPr>
+          <p:cNvPr id="3" name="Picture 2">
+            <a:extLst>
+              <a:ext uri="{FF2B5EF4-FFF2-40B4-BE49-F238E27FC236}">
+                <a16:creationId xmlns:a16="http://schemas.microsoft.com/office/drawing/2014/main" id="{3A34B8E4-F227-47E3-937F-BC808EAACB32}"/>
+              </a:ext>
+            </a:extLst>
+          </p:cNvPr>
+          <p:cNvPicPr>
+            <a:picLocks noChangeAspect="1"/>
+          </p:cNvPicPr>
+          <p:nvPr/>
+        </p:nvPicPr>
+        <p:blipFill>
+          <a:blip r:embed="rId2"/>
+          <a:stretch>
+            <a:fillRect/>
+          </a:stretch>
+        </p:blipFill>
+        <p:spPr>
+          <a:xfrm>
+            <a:off x="485692" y="1160726"/>
+            <a:ext cx="3650879" cy="2457715"/>
+          </a:xfrm>
+          <a:prstGeom prst="rect">
+            <a:avLst/>
+          </a:prstGeom>
+        </p:spPr>
+      </p:pic>
+      <p:pic>
+        <p:nvPicPr>
+          <p:cNvPr id="4" name="Picture 3"/>
+          <p:cNvPicPr>
+            <a:picLocks noChangeAspect="1"/>
+          </p:cNvPicPr>
+          <p:nvPr/>
+        </p:nvPicPr>
+        <p:blipFill>
+          <a:blip r:embed="rId3"/>
+          <a:stretch>
+            <a:fillRect/>
+          </a:stretch>
+        </p:blipFill>
+        <p:spPr>
+          <a:xfrm>
+            <a:off x="621918" y="4117248"/>
+            <a:ext cx="3514653" cy="2366010"/>
+          </a:xfrm>
+          <a:prstGeom prst="rect">
+            <a:avLst/>
+          </a:prstGeom>
+        </p:spPr>
+      </p:pic>
+      <p:pic>
+        <p:nvPicPr>
+          <p:cNvPr id="7" name="Picture 6"/>
+          <p:cNvPicPr>
+            <a:picLocks noChangeAspect="1"/>
+          </p:cNvPicPr>
+          <p:nvPr/>
+        </p:nvPicPr>
+        <p:blipFill>
+          <a:blip r:embed="rId4"/>
+          <a:stretch>
+            <a:fillRect/>
+          </a:stretch>
+        </p:blipFill>
+        <p:spPr>
+          <a:xfrm>
+            <a:off x="4287182" y="1259612"/>
+            <a:ext cx="4656409" cy="2259941"/>
+          </a:xfrm>
+          <a:prstGeom prst="rect">
+            <a:avLst/>
+          </a:prstGeom>
+          <a:solidFill>
+            <a:schemeClr val="tx1"/>
+          </a:solidFill>
+        </p:spPr>
+      </p:pic>
+      <p:pic>
+        <p:nvPicPr>
+          <p:cNvPr id="13" name="Picture 12"/>
+          <p:cNvPicPr>
+            <a:picLocks noChangeAspect="1"/>
+          </p:cNvPicPr>
+          <p:nvPr/>
+        </p:nvPicPr>
+        <p:blipFill>
+          <a:blip r:embed="rId5"/>
+          <a:stretch>
+            <a:fillRect/>
+          </a:stretch>
+        </p:blipFill>
+        <p:spPr>
+          <a:xfrm>
+            <a:off x="4316435" y="4353605"/>
+            <a:ext cx="4597901" cy="1893295"/>
+          </a:xfrm>
+          <a:prstGeom prst="rect">
+            <a:avLst/>
+          </a:prstGeom>
+          <a:solidFill>
+            <a:schemeClr val="tx1"/>
+          </a:solidFill>
+        </p:spPr>
+      </p:pic>
     </p:spTree>
     <p:extLst>
       <p:ext uri="{BB962C8B-B14F-4D97-AF65-F5344CB8AC3E}">
-        <p14:creationId xmlns:p14="http://schemas.microsoft.com/office/powerpoint/2010/main" val="208240022"/>
+        <p14:creationId xmlns:p14="http://schemas.microsoft.com/office/powerpoint/2010/main" val="2891254259"/>
       </p:ext>
     </p:extLst>
   </p:cSld>
   <p:clrMapOvr>
     <a:masterClrMapping/>
   </p:clrMapOvr>
-  <p:timing>
-    <p:tnLst>
-      <p:par>
-        <p:cTn id="1" dur="indefinite" restart="never" nodeType="tmRoot"/>
-      </p:par>
-    </p:tnLst>
-  </p:timing>
 </p:sld>
 </file>
 
@@ -9121,7 +9223,7 @@
         </p:nvSpPr>
         <p:spPr>
           <a:xfrm>
-            <a:off x="395641" y="475660"/>
+            <a:off x="385332" y="420976"/>
             <a:ext cx="6740917" cy="455986"/>
           </a:xfrm>
         </p:spPr>
@@ -9146,10 +9248,10 @@
       </p:sp>
       <p:pic>
         <p:nvPicPr>
-          <p:cNvPr id="3" name="Picture 2">
+          <p:cNvPr id="6" name="Picture 5">
             <a:extLst>
               <a:ext uri="{FF2B5EF4-FFF2-40B4-BE49-F238E27FC236}">
-                <a16:creationId xmlns="" xmlns:xdr="http://schemas.openxmlformats.org/drawingml/2006/spreadsheetDrawing" xmlns:a16="http://schemas.microsoft.com/office/drawing/2014/main" xmlns:lc="http://schemas.openxmlformats.org/drawingml/2006/lockedCanvas" id="{3A34B8E4-F227-47E3-937F-BC808EAACB32}"/>
+                <a16:creationId xmlns:a16="http://schemas.microsoft.com/office/drawing/2014/main" id="{1A15AAD6-97C9-4CE4-9492-847A2E66090A}"/>
               </a:ext>
             </a:extLst>
           </p:cNvPr>
@@ -9166,56 +9268,8 @@
         </p:blipFill>
         <p:spPr>
           <a:xfrm>
-            <a:off x="485692" y="1143309"/>
-            <a:ext cx="3514653" cy="2366010"/>
-          </a:xfrm>
-          <a:prstGeom prst="rect">
-            <a:avLst/>
-          </a:prstGeom>
-        </p:spPr>
-      </p:pic>
-      <p:pic>
-        <p:nvPicPr>
-          <p:cNvPr id="4" name="Picture 3"/>
-          <p:cNvPicPr>
-            <a:picLocks noChangeAspect="1"/>
-          </p:cNvPicPr>
-          <p:nvPr/>
-        </p:nvPicPr>
-        <p:blipFill>
-          <a:blip r:embed="rId3"/>
-          <a:stretch>
-            <a:fillRect/>
-          </a:stretch>
-        </p:blipFill>
-        <p:spPr>
-          <a:xfrm>
-            <a:off x="485693" y="3828844"/>
-            <a:ext cx="3514653" cy="2366010"/>
-          </a:xfrm>
-          <a:prstGeom prst="rect">
-            <a:avLst/>
-          </a:prstGeom>
-        </p:spPr>
-      </p:pic>
-      <p:pic>
-        <p:nvPicPr>
-          <p:cNvPr id="7" name="Picture 6"/>
-          <p:cNvPicPr>
-            <a:picLocks noChangeAspect="1"/>
-          </p:cNvPicPr>
-          <p:nvPr/>
-        </p:nvPicPr>
-        <p:blipFill>
-          <a:blip r:embed="rId4"/>
-          <a:stretch>
-            <a:fillRect/>
-          </a:stretch>
-        </p:blipFill>
-        <p:spPr>
-          <a:xfrm>
-            <a:off x="4527670" y="1278660"/>
-            <a:ext cx="4171487" cy="2024589"/>
+            <a:off x="385332" y="1599237"/>
+            <a:ext cx="4702629" cy="4529847"/>
           </a:xfrm>
           <a:prstGeom prst="rect">
             <a:avLst/>
@@ -9223,52 +9277,30 @@
           <a:solidFill>
             <a:schemeClr val="tx1"/>
           </a:solidFill>
-        </p:spPr>
-      </p:pic>
-      <p:pic>
-        <p:nvPicPr>
-          <p:cNvPr id="13" name="Picture 12"/>
-          <p:cNvPicPr>
-            <a:picLocks noChangeAspect="1"/>
-          </p:cNvPicPr>
-          <p:nvPr/>
-        </p:nvPicPr>
-        <p:blipFill>
-          <a:blip r:embed="rId5"/>
-          <a:stretch>
-            <a:fillRect/>
-          </a:stretch>
-        </p:blipFill>
-        <p:spPr>
-          <a:xfrm>
-            <a:off x="4527671" y="4117248"/>
-            <a:ext cx="3883162" cy="1598984"/>
-          </a:xfrm>
-          <a:prstGeom prst="rect">
-            <a:avLst/>
-          </a:prstGeom>
-          <a:solidFill>
-            <a:schemeClr val="tx1"/>
-          </a:solidFill>
+          <a:ln>
+            <a:solidFill>
+              <a:schemeClr val="bg1"/>
+            </a:solidFill>
+          </a:ln>
+          <a:effectLst>
+            <a:outerShdw blurRad="50800" dist="38100" dir="5400000" algn="t" rotWithShape="0">
+              <a:prstClr val="black">
+                <a:alpha val="40000"/>
+              </a:prstClr>
+            </a:outerShdw>
+          </a:effectLst>
         </p:spPr>
       </p:pic>
     </p:spTree>
     <p:extLst>
       <p:ext uri="{BB962C8B-B14F-4D97-AF65-F5344CB8AC3E}">
-        <p14:creationId xmlns:p14="http://schemas.microsoft.com/office/powerpoint/2010/main" val="3187457802"/>
+        <p14:creationId xmlns:p14="http://schemas.microsoft.com/office/powerpoint/2010/main" val="208240022"/>
       </p:ext>
     </p:extLst>
   </p:cSld>
   <p:clrMapOvr>
     <a:masterClrMapping/>
   </p:clrMapOvr>
-  <p:timing>
-    <p:tnLst>
-      <p:par>
-        <p:cTn id="1" dur="indefinite" restart="never" nodeType="tmRoot"/>
-      </p:par>
-    </p:tnLst>
-  </p:timing>
 </p:sld>
 </file>
 
@@ -9294,7 +9326,7 @@
           <p:cNvPr id="2" name="Title 1">
             <a:extLst>
               <a:ext uri="{FF2B5EF4-FFF2-40B4-BE49-F238E27FC236}">
-                <a16:creationId xmlns="" xmlns:a16="http://schemas.microsoft.com/office/drawing/2014/main" id="{89ACD353-C798-47C3-AA0F-1931DC1383AA}"/>
+                <a16:creationId xmlns:a16="http://schemas.microsoft.com/office/drawing/2014/main" id="{89ACD353-C798-47C3-AA0F-1931DC1383AA}"/>
               </a:ext>
             </a:extLst>
           </p:cNvPr>
@@ -9317,13 +9349,8 @@
           <a:p>
             <a:r>
               <a:rPr lang="en-IN" dirty="0"/>
-              <a:t>INSIGHTS AND </a:t>
-            </a:r>
-            <a:r>
-              <a:rPr lang="en-IN" dirty="0" smtClean="0"/>
-              <a:t>RECOMMENDATIONs</a:t>
-            </a:r>
-            <a:endParaRPr lang="en-IN" dirty="0"/>
+              <a:t>INSIGHTS AND RECOMMENDATIONs</a:t>
+            </a:r>
           </a:p>
         </p:txBody>
       </p:sp>
@@ -9332,7 +9359,7 @@
           <p:cNvPr id="4" name="Content Placeholder 3">
             <a:extLst>
               <a:ext uri="{FF2B5EF4-FFF2-40B4-BE49-F238E27FC236}">
-                <a16:creationId xmlns="" xmlns:a16="http://schemas.microsoft.com/office/drawing/2014/main" id="{D215D07A-4FFF-4A0D-ADB3-C2AE0AD20B20}"/>
+                <a16:creationId xmlns:a16="http://schemas.microsoft.com/office/drawing/2014/main" id="{D215D07A-4FFF-4A0D-ADB3-C2AE0AD20B20}"/>
               </a:ext>
             </a:extLst>
           </p:cNvPr>
@@ -9353,7 +9380,24 @@
           <a:bodyPr/>
           <a:lstStyle/>
           <a:p>
-            <a:endParaRPr lang="en-IN" dirty="0"/>
+            <a:r>
+              <a:rPr lang="en-IN" dirty="0"/>
+              <a:t>The question I wanted to answer was failure rate of which </a:t>
+            </a:r>
+            <a:r>
+              <a:rPr lang="en-IN" dirty="0" err="1"/>
+              <a:t>equipments</a:t>
+            </a:r>
+            <a:r>
+              <a:rPr lang="en-IN" dirty="0"/>
+              <a:t> were higher.</a:t>
+            </a:r>
+          </a:p>
+          <a:p>
+            <a:r>
+              <a:rPr lang="en-IN" dirty="0"/>
+              <a:t>To find which </a:t>
+            </a:r>
           </a:p>
         </p:txBody>
       </p:sp>
@@ -9367,13 +9411,6 @@
   <p:clrMapOvr>
     <a:masterClrMapping/>
   </p:clrMapOvr>
-  <p:timing>
-    <p:tnLst>
-      <p:par>
-        <p:cTn id="1" dur="indefinite" restart="never" nodeType="tmRoot"/>
-      </p:par>
-    </p:tnLst>
-  </p:timing>
 </p:sld>
 </file>
 

</xml_diff>